<commit_message>
removed remaining German text
</commit_message>
<xml_diff>
--- a/materials/day05_linguistic_annotation.pptx
+++ b/materials/day05_linguistic_annotation.pptx
@@ -271,7 +271,7 @@
               <a:pPr>
                 <a:defRPr/>
               </a:pPr>
-              <a:t>14.02.2023</a:t>
+              <a:t>17.02.2023</a:t>
             </a:fld>
             <a:endParaRPr lang="de-DE"/>
           </a:p>
@@ -487,7 +487,7 @@
               <a:pPr>
                 <a:defRPr/>
               </a:pPr>
-              <a:t>14.02.2023</a:t>
+              <a:t>17.02.2023</a:t>
             </a:fld>
             <a:endParaRPr lang="de-DE"/>
           </a:p>
@@ -974,14 +974,14 @@
             </a:ln>
             <a:extLst>
               <a:ext uri="{909E8E84-426E-40dd-AFC4-6F175D3DCCD1}">
-                <a14:hiddenFill xmlns="" xmlns:a14="http://schemas.microsoft.com/office/drawing/2010/main">
+                <a14:hiddenFill xmlns:a14="http://schemas.microsoft.com/office/drawing/2010/main" xmlns="">
                   <a:solidFill>
                     <a:srgbClr val="FFFFFF"/>
                   </a:solidFill>
                 </a14:hiddenFill>
               </a:ext>
               <a:ext uri="{91240B29-F687-4f45-9708-019B960494DF}">
-                <a14:hiddenLine xmlns="" xmlns:a14="http://schemas.microsoft.com/office/drawing/2010/main" w="9525">
+                <a14:hiddenLine xmlns:a14="http://schemas.microsoft.com/office/drawing/2010/main" xmlns="" w="9525">
                   <a:solidFill>
                     <a:srgbClr val="000000"/>
                   </a:solidFill>
@@ -1017,7 +1017,7 @@
             </a:ln>
             <a:extLst>
               <a:ext uri="{91240B29-F687-4f45-9708-019B960494DF}">
-                <a14:hiddenLine xmlns="" xmlns:a14="http://schemas.microsoft.com/office/drawing/2010/main" w="9525">
+                <a14:hiddenLine xmlns:a14="http://schemas.microsoft.com/office/drawing/2010/main" xmlns="" w="9525">
                   <a:solidFill>
                     <a:srgbClr val="000000"/>
                   </a:solidFill>
@@ -1680,14 +1680,14 @@
             </a:ln>
             <a:extLst>
               <a:ext uri="{909E8E84-426E-40dd-AFC4-6F175D3DCCD1}">
-                <a14:hiddenFill xmlns="" xmlns:a14="http://schemas.microsoft.com/office/drawing/2010/main">
+                <a14:hiddenFill xmlns:a14="http://schemas.microsoft.com/office/drawing/2010/main" xmlns="">
                   <a:solidFill>
                     <a:srgbClr val="FFFFFF"/>
                   </a:solidFill>
                 </a14:hiddenFill>
               </a:ext>
               <a:ext uri="{91240B29-F687-4f45-9708-019B960494DF}">
-                <a14:hiddenLine xmlns="" xmlns:a14="http://schemas.microsoft.com/office/drawing/2010/main" w="9525">
+                <a14:hiddenLine xmlns:a14="http://schemas.microsoft.com/office/drawing/2010/main" xmlns="" w="9525">
                   <a:solidFill>
                     <a:srgbClr val="000000"/>
                   </a:solidFill>
@@ -1723,7 +1723,7 @@
             </a:ln>
             <a:extLst>
               <a:ext uri="{91240B29-F687-4f45-9708-019B960494DF}">
-                <a14:hiddenLine xmlns="" xmlns:a14="http://schemas.microsoft.com/office/drawing/2010/main" w="9525">
+                <a14:hiddenLine xmlns:a14="http://schemas.microsoft.com/office/drawing/2010/main" xmlns="" w="9525">
                   <a:solidFill>
                     <a:srgbClr val="000000"/>
                   </a:solidFill>
@@ -3132,17 +3132,17 @@
           </a:ln>
           <a:extLst>
             <a:ext uri="{FAA26D3D-D897-4be2-8F04-BA451C77F1D7}">
-              <ma14:placeholderFlag xmlns="" xmlns:ma14="http://schemas.microsoft.com/office/mac/drawingml/2011/main" val="1"/>
+              <ma14:placeholderFlag xmlns:ma14="http://schemas.microsoft.com/office/mac/drawingml/2011/main" xmlns="" val="1"/>
             </a:ext>
             <a:ext uri="{909E8E84-426E-40dd-AFC4-6F175D3DCCD1}">
-              <a14:hiddenFill xmlns="" xmlns:a14="http://schemas.microsoft.com/office/drawing/2010/main">
+              <a14:hiddenFill xmlns:a14="http://schemas.microsoft.com/office/drawing/2010/main" xmlns="">
                 <a:solidFill>
                   <a:srgbClr val="FFFFFF"/>
                 </a:solidFill>
               </a14:hiddenFill>
             </a:ext>
             <a:ext uri="{91240B29-F687-4f45-9708-019B960494DF}">
-              <a14:hiddenLine xmlns="" xmlns:a14="http://schemas.microsoft.com/office/drawing/2010/main" w="9525">
+              <a14:hiddenLine xmlns:a14="http://schemas.microsoft.com/office/drawing/2010/main" xmlns="" w="9525">
                 <a:solidFill>
                   <a:srgbClr val="000000"/>
                 </a:solidFill>
@@ -3193,17 +3193,17 @@
           </a:ln>
           <a:extLst>
             <a:ext uri="{FAA26D3D-D897-4be2-8F04-BA451C77F1D7}">
-              <ma14:placeholderFlag xmlns="" xmlns:ma14="http://schemas.microsoft.com/office/mac/drawingml/2011/main" val="1"/>
+              <ma14:placeholderFlag xmlns:ma14="http://schemas.microsoft.com/office/mac/drawingml/2011/main" xmlns="" val="1"/>
             </a:ext>
             <a:ext uri="{909E8E84-426E-40dd-AFC4-6F175D3DCCD1}">
-              <a14:hiddenFill xmlns="" xmlns:a14="http://schemas.microsoft.com/office/drawing/2010/main">
+              <a14:hiddenFill xmlns:a14="http://schemas.microsoft.com/office/drawing/2010/main" xmlns="">
                 <a:solidFill>
                   <a:srgbClr val="FFFFFF"/>
                 </a:solidFill>
               </a14:hiddenFill>
             </a:ext>
             <a:ext uri="{91240B29-F687-4f45-9708-019B960494DF}">
-              <a14:hiddenLine xmlns="" xmlns:a14="http://schemas.microsoft.com/office/drawing/2010/main" w="9525">
+              <a14:hiddenLine xmlns:a14="http://schemas.microsoft.com/office/drawing/2010/main" xmlns="" w="9525">
                 <a:solidFill>
                   <a:srgbClr val="000000"/>
                 </a:solidFill>
@@ -5129,11 +5129,11 @@
             </a:r>
             <a:r>
               <a:rPr lang="en-US" dirty="0" err="1"/>
-              <a:t>Tokenisierung</a:t>
-            </a:r>
-            <a:r>
-              <a:rPr lang="en-US" dirty="0"/>
-              <a:t> und Tagging</a:t>
+              <a:t>tokenisation</a:t>
+            </a:r>
+            <a:r>
+              <a:rPr lang="en-US" dirty="0"/>
+              <a:t> and tagging</a:t>
             </a:r>
             <a:endParaRPr lang="en-US" dirty="0">
               <a:solidFill>

</xml_diff>